<commit_message>
add images in slide
</commit_message>
<xml_diff>
--- a/Sample Presentation.pptx
+++ b/Sample Presentation.pptx
@@ -6,9 +6,10 @@
   </p:sldMasterIdLst>
   <p:sldIdLst>
     <p:sldId id="256" r:id="rId2"/>
+    <p:sldId id="257" r:id="rId3"/>
   </p:sldIdLst>
   <p:notesMasterIdLst>
-    <p:notesMasterId r:id="rId3"/>
+    <p:notesMasterId r:id="rId4"/>
   </p:notesMasterIdLst>
   <p:sldSz cx="9144000" cy="5143500"/>
   <p:notesSz cx="5143500" cy="9144000"/>
@@ -526,6 +527,94 @@
             <a:fld id="{F7021451-1387-4CA6-816F-3879F97B5CBC}" type="slidenum">
               <a:rPr lang="en-US"/>
               <a:t>1</a:t>
+            </a:fld>
+            <a:endParaRPr lang="en-US"/>
+          </a:p>
+        </p:txBody>
+      </p:sp>
+    </p:spTree>
+    <p:extLst>
+      <p:ext uri="{BB962C8B-B14F-4D97-AF65-F5344CB8AC3E}">
+        <p14:creationId xmlns:p14="http://schemas.microsoft.com/office/powerpoint/2010/main" val="1024086991"/>
+      </p:ext>
+    </p:extLst>
+  </p:cSld>
+  <p:clrMapOvr>
+    <a:masterClrMapping/>
+  </p:clrMapOvr>
+</p:notes>
+</file>
+
+<file path=ppt/notesSlides/notesSlide2.xml><?xml version="1.0" encoding="utf-8"?>
+<p:notes xmlns:a="http://schemas.openxmlformats.org/drawingml/2006/main" xmlns:r="http://schemas.openxmlformats.org/officeDocument/2006/relationships" xmlns:p="http://schemas.openxmlformats.org/presentationml/2006/main">
+  <p:cSld>
+    <p:spTree>
+      <p:nvGrpSpPr>
+        <p:cNvPr id="1" name=""/>
+        <p:cNvGrpSpPr/>
+        <p:nvPr/>
+      </p:nvGrpSpPr>
+      <p:grpSpPr>
+        <a:xfrm>
+          <a:off x="0" y="0"/>
+          <a:ext cx="0" cy="0"/>
+          <a:chOff x="0" y="0"/>
+          <a:chExt cx="0" cy="0"/>
+        </a:xfrm>
+      </p:grpSpPr>
+      <p:sp>
+        <p:nvSpPr>
+          <p:cNvPr id="2" name="Slide Image Placeholder 1"/>
+          <p:cNvSpPr>
+            <a:spLocks noGrp="1" noRot="1" noChangeAspect="1"/>
+          </p:cNvSpPr>
+          <p:nvPr>
+            <p:ph type="sldImg"/>
+          </p:nvPr>
+        </p:nvSpPr>
+        <p:spPr/>
+      </p:sp>
+      <p:sp>
+        <p:nvSpPr>
+          <p:cNvPr id="3" name="Notes Placeholder 2"/>
+          <p:cNvSpPr>
+            <a:spLocks noGrp="1"/>
+          </p:cNvSpPr>
+          <p:nvPr>
+            <p:ph type="body" idx="1"/>
+          </p:nvPr>
+        </p:nvSpPr>
+        <p:spPr/>
+        <p:txBody>
+          <a:bodyPr/>
+          <a:lstStyle/>
+          <a:p>
+            <a:r>
+              <a:rPr lang="en-US" dirty="0"/>
+              <a:t/>
+            </a:r>
+            <a:endParaRPr lang="en-US" dirty="0"/>
+          </a:p>
+        </p:txBody>
+      </p:sp>
+      <p:sp>
+        <p:nvSpPr>
+          <p:cNvPr id="4" name="Slide Number Placeholder 3"/>
+          <p:cNvSpPr>
+            <a:spLocks noGrp="1"/>
+          </p:cNvSpPr>
+          <p:nvPr>
+            <p:ph type="sldNum" sz="quarter" idx="10"/>
+          </p:nvPr>
+        </p:nvSpPr>
+        <p:spPr/>
+        <p:txBody>
+          <a:bodyPr/>
+          <a:lstStyle/>
+          <a:p>
+            <a:fld id="{F7021451-1387-4CA6-816F-3879F97B5CBC}" type="slidenum">
+              <a:rPr lang="en-US"/>
+              <a:t>2</a:t>
             </a:fld>
             <a:endParaRPr lang="en-US"/>
           </a:p>
@@ -904,6 +993,79 @@
           </a:p>
         </p:txBody>
       </p:sp>
+    </p:spTree>
+  </p:cSld>
+  <p:clrMapOvr>
+    <a:masterClrMapping/>
+  </p:clrMapOvr>
+</p:sld>
+</file>
+
+<file path=ppt/slides/slide2.xml><?xml version="1.0" encoding="utf-8"?>
+<p:sld xmlns:a="http://schemas.openxmlformats.org/drawingml/2006/main" xmlns:r="http://schemas.openxmlformats.org/officeDocument/2006/relationships" xmlns:p="http://schemas.openxmlformats.org/presentationml/2006/main">
+  <p:cSld name="Slide 2">
+    <p:spTree>
+      <p:nvGrpSpPr>
+        <p:cNvPr id="1" name=""/>
+        <p:cNvGrpSpPr/>
+        <p:nvPr/>
+      </p:nvGrpSpPr>
+      <p:grpSpPr>
+        <a:xfrm>
+          <a:off x="0" y="0"/>
+          <a:ext cx="0" cy="0"/>
+          <a:chOff x="0" y="0"/>
+          <a:chExt cx="0" cy="0"/>
+        </a:xfrm>
+      </p:grpSpPr>
+      <p:pic>
+        <p:nvPicPr>
+          <p:cNvPr id="2" name="Object 1" descr="https://images.unsplash.com/photo-1578574577315-3fbeb0cecdc2?ixlib=rb-1.2.1&amp;ixid=MnwxMjA3fDB8MHxwaG90by1wYWdlfHx8fGVufDB8fHx8&amp;auto=format&amp;fit=crop&amp;w=872&amp;q=80">    </p:cNvPr>
+          <p:cNvPicPr>
+            <a:picLocks noChangeAspect="1"/>
+          </p:cNvPicPr>
+          <p:nvPr/>
+        </p:nvPicPr>
+        <p:blipFill>
+          <a:blip r:embed="rId1"/>
+          <a:stretch>
+            <a:fillRect/>
+          </a:stretch>
+        </p:blipFill>
+        <p:spPr>
+          <a:xfrm>
+            <a:off x="914400" y="1828800"/>
+            <a:ext cx="914400" cy="914400"/>
+          </a:xfrm>
+          <a:prstGeom prst="rect">
+            <a:avLst/>
+          </a:prstGeom>
+        </p:spPr>
+      </p:pic>
+      <p:pic>
+        <p:nvPicPr>
+          <p:cNvPr id="3" name="Object 2" descr="https://images.unsplash.com/photo-1578574577315-3fbeb0cecdc2?ixlib=rb-1.2.1&amp;ixid=MnwxMjA3fDB8MHxwaG90by1wYWdlfHx8fGVufDB8fHx8&amp;auto=format&amp;fit=crop&amp;w=872&amp;q=80">    </p:cNvPr>
+          <p:cNvPicPr>
+            <a:picLocks noChangeAspect="1"/>
+          </p:cNvPicPr>
+          <p:nvPr/>
+        </p:nvPicPr>
+        <p:blipFill>
+          <a:blip r:embed="rId2"/>
+          <a:stretch>
+            <a:fillRect/>
+          </a:stretch>
+        </p:blipFill>
+        <p:spPr>
+          <a:xfrm>
+            <a:off x="4572000" y="2743200"/>
+            <a:ext cx="914400" cy="914400"/>
+          </a:xfrm>
+          <a:prstGeom prst="rect">
+            <a:avLst/>
+          </a:prstGeom>
+        </p:spPr>
+      </p:pic>
     </p:spTree>
   </p:cSld>
   <p:clrMapOvr>

</xml_diff>